<commit_message>
200408 Update All Files
</commit_message>
<xml_diff>
--- a/02 Scheduler/200406_Hexapod 수식정리.pptx
+++ b/02 Scheduler/200406_Hexapod 수식정리.pptx
@@ -3475,8 +3475,8 @@
           </a:p>
         </p:txBody>
       </p:sp>
-      <mc:AlternateContent xmlns:mc="http://schemas.openxmlformats.org/markup-compatibility/2006">
-        <mc:Choice xmlns:a14="http://schemas.microsoft.com/office/drawing/2010/main" Requires="a14">
+      <mc:AlternateContent xmlns:mc="http://schemas.openxmlformats.org/markup-compatibility/2006" xmlns:a14="http://schemas.microsoft.com/office/drawing/2010/main">
+        <mc:Choice Requires="a14">
           <p:sp>
             <p:nvSpPr>
               <p:cNvPr id="19" name="TextBox 18">
@@ -3905,7 +3905,7 @@
             </p:txBody>
           </p:sp>
         </mc:Choice>
-        <mc:Fallback>
+        <mc:Fallback xmlns="">
           <p:sp>
             <p:nvSpPr>
               <p:cNvPr id="19" name="TextBox 18">
@@ -4100,8 +4100,8 @@
           </a:p>
         </p:txBody>
       </p:sp>
-      <mc:AlternateContent xmlns:mc="http://schemas.openxmlformats.org/markup-compatibility/2006">
-        <mc:Choice xmlns:a14="http://schemas.microsoft.com/office/drawing/2010/main" Requires="a14">
+      <mc:AlternateContent xmlns:mc="http://schemas.openxmlformats.org/markup-compatibility/2006" xmlns:a14="http://schemas.microsoft.com/office/drawing/2010/main">
+        <mc:Choice Requires="a14">
           <p:sp>
             <p:nvSpPr>
               <p:cNvPr id="31" name="TextBox 30">
@@ -4170,7 +4170,7 @@
             </p:txBody>
           </p:sp>
         </mc:Choice>
-        <mc:Fallback>
+        <mc:Fallback xmlns="">
           <p:sp>
             <p:nvSpPr>
               <p:cNvPr id="31" name="TextBox 30">
@@ -4333,8 +4333,8 @@
           </a:p>
         </p:txBody>
       </p:sp>
-      <mc:AlternateContent xmlns:mc="http://schemas.openxmlformats.org/markup-compatibility/2006">
-        <mc:Choice xmlns:a14="http://schemas.microsoft.com/office/drawing/2010/main" Requires="a14">
+      <mc:AlternateContent xmlns:mc="http://schemas.openxmlformats.org/markup-compatibility/2006" xmlns:a14="http://schemas.microsoft.com/office/drawing/2010/main">
+        <mc:Choice Requires="a14">
           <p:sp>
             <p:nvSpPr>
               <p:cNvPr id="61" name="TextBox 60">
@@ -4403,7 +4403,7 @@
             </p:txBody>
           </p:sp>
         </mc:Choice>
-        <mc:Fallback>
+        <mc:Fallback xmlns="">
           <p:sp>
             <p:nvSpPr>
               <p:cNvPr id="61" name="TextBox 60">
@@ -4448,8 +4448,8 @@
           </p:sp>
         </mc:Fallback>
       </mc:AlternateContent>
-      <mc:AlternateContent xmlns:mc="http://schemas.openxmlformats.org/markup-compatibility/2006">
-        <mc:Choice xmlns:a14="http://schemas.microsoft.com/office/drawing/2010/main" Requires="a14">
+      <mc:AlternateContent xmlns:mc="http://schemas.openxmlformats.org/markup-compatibility/2006" xmlns:a14="http://schemas.microsoft.com/office/drawing/2010/main">
+        <mc:Choice Requires="a14">
           <p:sp>
             <p:nvSpPr>
               <p:cNvPr id="62" name="TextBox 61">
@@ -4518,7 +4518,7 @@
             </p:txBody>
           </p:sp>
         </mc:Choice>
-        <mc:Fallback>
+        <mc:Fallback xmlns="">
           <p:sp>
             <p:nvSpPr>
               <p:cNvPr id="62" name="TextBox 61">
@@ -4563,8 +4563,8 @@
           </p:sp>
         </mc:Fallback>
       </mc:AlternateContent>
-      <mc:AlternateContent xmlns:mc="http://schemas.openxmlformats.org/markup-compatibility/2006">
-        <mc:Choice xmlns:a14="http://schemas.microsoft.com/office/drawing/2010/main" Requires="a14">
+      <mc:AlternateContent xmlns:mc="http://schemas.openxmlformats.org/markup-compatibility/2006" xmlns:a14="http://schemas.microsoft.com/office/drawing/2010/main">
+        <mc:Choice Requires="a14">
           <p:sp>
             <p:nvSpPr>
               <p:cNvPr id="63" name="TextBox 62">
@@ -4633,7 +4633,7 @@
             </p:txBody>
           </p:sp>
         </mc:Choice>
-        <mc:Fallback>
+        <mc:Fallback xmlns="">
           <p:sp>
             <p:nvSpPr>
               <p:cNvPr id="63" name="TextBox 62">
@@ -4678,8 +4678,8 @@
           </p:sp>
         </mc:Fallback>
       </mc:AlternateContent>
-      <mc:AlternateContent xmlns:mc="http://schemas.openxmlformats.org/markup-compatibility/2006">
-        <mc:Choice xmlns:a14="http://schemas.microsoft.com/office/drawing/2010/main" Requires="a14">
+      <mc:AlternateContent xmlns:mc="http://schemas.openxmlformats.org/markup-compatibility/2006" xmlns:a14="http://schemas.microsoft.com/office/drawing/2010/main">
+        <mc:Choice Requires="a14">
           <p:sp>
             <p:nvSpPr>
               <p:cNvPr id="64" name="TextBox 63">
@@ -4748,7 +4748,7 @@
             </p:txBody>
           </p:sp>
         </mc:Choice>
-        <mc:Fallback>
+        <mc:Fallback xmlns="">
           <p:sp>
             <p:nvSpPr>
               <p:cNvPr id="64" name="TextBox 63">
@@ -4793,8 +4793,8 @@
           </p:sp>
         </mc:Fallback>
       </mc:AlternateContent>
-      <mc:AlternateContent xmlns:mc="http://schemas.openxmlformats.org/markup-compatibility/2006">
-        <mc:Choice xmlns:a14="http://schemas.microsoft.com/office/drawing/2010/main" Requires="a14">
+      <mc:AlternateContent xmlns:mc="http://schemas.openxmlformats.org/markup-compatibility/2006" xmlns:a14="http://schemas.microsoft.com/office/drawing/2010/main">
+        <mc:Choice Requires="a14">
           <p:sp>
             <p:nvSpPr>
               <p:cNvPr id="65" name="TextBox 64">
@@ -4863,7 +4863,7 @@
             </p:txBody>
           </p:sp>
         </mc:Choice>
-        <mc:Fallback>
+        <mc:Fallback xmlns="">
           <p:sp>
             <p:nvSpPr>
               <p:cNvPr id="65" name="TextBox 64">
@@ -4908,8 +4908,8 @@
           </p:sp>
         </mc:Fallback>
       </mc:AlternateContent>
-      <mc:AlternateContent xmlns:mc="http://schemas.openxmlformats.org/markup-compatibility/2006">
-        <mc:Choice xmlns:a14="http://schemas.microsoft.com/office/drawing/2010/main" Requires="a14">
+      <mc:AlternateContent xmlns:mc="http://schemas.openxmlformats.org/markup-compatibility/2006" xmlns:a14="http://schemas.microsoft.com/office/drawing/2010/main">
+        <mc:Choice Requires="a14">
           <p:sp>
             <p:nvSpPr>
               <p:cNvPr id="66" name="TextBox 65">
@@ -4978,7 +4978,7 @@
             </p:txBody>
           </p:sp>
         </mc:Choice>
-        <mc:Fallback>
+        <mc:Fallback xmlns="">
           <p:sp>
             <p:nvSpPr>
               <p:cNvPr id="66" name="TextBox 65">
@@ -5023,8 +5023,8 @@
           </p:sp>
         </mc:Fallback>
       </mc:AlternateContent>
-      <mc:AlternateContent xmlns:mc="http://schemas.openxmlformats.org/markup-compatibility/2006">
-        <mc:Choice xmlns:a14="http://schemas.microsoft.com/office/drawing/2010/main" Requires="a14">
+      <mc:AlternateContent xmlns:mc="http://schemas.openxmlformats.org/markup-compatibility/2006" xmlns:a14="http://schemas.microsoft.com/office/drawing/2010/main">
+        <mc:Choice Requires="a14">
           <p:sp>
             <p:nvSpPr>
               <p:cNvPr id="67" name="TextBox 66">
@@ -5093,7 +5093,7 @@
             </p:txBody>
           </p:sp>
         </mc:Choice>
-        <mc:Fallback>
+        <mc:Fallback xmlns="">
           <p:sp>
             <p:nvSpPr>
               <p:cNvPr id="67" name="TextBox 66">
@@ -5197,8 +5197,8 @@
           </a:p>
         </p:txBody>
       </p:sp>
-      <mc:AlternateContent xmlns:mc="http://schemas.openxmlformats.org/markup-compatibility/2006">
-        <mc:Choice xmlns:a14="http://schemas.microsoft.com/office/drawing/2010/main" Requires="a14">
+      <mc:AlternateContent xmlns:mc="http://schemas.openxmlformats.org/markup-compatibility/2006" xmlns:a14="http://schemas.microsoft.com/office/drawing/2010/main">
+        <mc:Choice Requires="a14">
           <p:sp>
             <p:nvSpPr>
               <p:cNvPr id="34" name="TextBox 33">
@@ -5267,7 +5267,7 @@
             </p:txBody>
           </p:sp>
         </mc:Choice>
-        <mc:Fallback>
+        <mc:Fallback xmlns="">
           <p:sp>
             <p:nvSpPr>
               <p:cNvPr id="34" name="TextBox 33">
@@ -5371,8 +5371,8 @@
           </a:p>
         </p:txBody>
       </p:sp>
-      <mc:AlternateContent xmlns:mc="http://schemas.openxmlformats.org/markup-compatibility/2006">
-        <mc:Choice xmlns:a14="http://schemas.microsoft.com/office/drawing/2010/main" Requires="a14">
+      <mc:AlternateContent xmlns:mc="http://schemas.openxmlformats.org/markup-compatibility/2006" xmlns:a14="http://schemas.microsoft.com/office/drawing/2010/main">
+        <mc:Choice Requires="a14">
           <p:sp>
             <p:nvSpPr>
               <p:cNvPr id="71" name="TextBox 70">
@@ -5441,7 +5441,7 @@
             </p:txBody>
           </p:sp>
         </mc:Choice>
-        <mc:Fallback>
+        <mc:Fallback xmlns="">
           <p:sp>
             <p:nvSpPr>
               <p:cNvPr id="71" name="TextBox 70">
@@ -5545,8 +5545,8 @@
           </a:p>
         </p:txBody>
       </p:sp>
-      <mc:AlternateContent xmlns:mc="http://schemas.openxmlformats.org/markup-compatibility/2006">
-        <mc:Choice xmlns:a14="http://schemas.microsoft.com/office/drawing/2010/main" Requires="a14">
+      <mc:AlternateContent xmlns:mc="http://schemas.openxmlformats.org/markup-compatibility/2006" xmlns:a14="http://schemas.microsoft.com/office/drawing/2010/main">
+        <mc:Choice Requires="a14">
           <p:sp>
             <p:nvSpPr>
               <p:cNvPr id="73" name="TextBox 72">
@@ -5615,7 +5615,7 @@
             </p:txBody>
           </p:sp>
         </mc:Choice>
-        <mc:Fallback>
+        <mc:Fallback xmlns="">
           <p:sp>
             <p:nvSpPr>
               <p:cNvPr id="73" name="TextBox 72">
@@ -5660,8 +5660,8 @@
           </p:sp>
         </mc:Fallback>
       </mc:AlternateContent>
-      <mc:AlternateContent xmlns:mc="http://schemas.openxmlformats.org/markup-compatibility/2006">
-        <mc:Choice xmlns:a14="http://schemas.microsoft.com/office/drawing/2010/main" Requires="a14">
+      <mc:AlternateContent xmlns:mc="http://schemas.openxmlformats.org/markup-compatibility/2006" xmlns:a14="http://schemas.microsoft.com/office/drawing/2010/main">
+        <mc:Choice Requires="a14">
           <p:sp>
             <p:nvSpPr>
               <p:cNvPr id="75" name="TextBox 74">
@@ -5730,7 +5730,7 @@
             </p:txBody>
           </p:sp>
         </mc:Choice>
-        <mc:Fallback>
+        <mc:Fallback xmlns="">
           <p:sp>
             <p:nvSpPr>
               <p:cNvPr id="75" name="TextBox 74">
@@ -5775,8 +5775,8 @@
           </p:sp>
         </mc:Fallback>
       </mc:AlternateContent>
-      <mc:AlternateContent xmlns:mc="http://schemas.openxmlformats.org/markup-compatibility/2006">
-        <mc:Choice xmlns:a14="http://schemas.microsoft.com/office/drawing/2010/main" Requires="a14">
+      <mc:AlternateContent xmlns:mc="http://schemas.openxmlformats.org/markup-compatibility/2006" xmlns:a14="http://schemas.microsoft.com/office/drawing/2010/main">
+        <mc:Choice Requires="a14">
           <p:sp>
             <p:nvSpPr>
               <p:cNvPr id="76" name="TextBox 75">
@@ -5845,7 +5845,7 @@
             </p:txBody>
           </p:sp>
         </mc:Choice>
-        <mc:Fallback>
+        <mc:Fallback xmlns="">
           <p:sp>
             <p:nvSpPr>
               <p:cNvPr id="76" name="TextBox 75">
@@ -5890,8 +5890,8 @@
           </p:sp>
         </mc:Fallback>
       </mc:AlternateContent>
-      <mc:AlternateContent xmlns:mc="http://schemas.openxmlformats.org/markup-compatibility/2006">
-        <mc:Choice xmlns:a14="http://schemas.microsoft.com/office/drawing/2010/main" Requires="a14">
+      <mc:AlternateContent xmlns:mc="http://schemas.openxmlformats.org/markup-compatibility/2006" xmlns:a14="http://schemas.microsoft.com/office/drawing/2010/main">
+        <mc:Choice Requires="a14">
           <p:sp>
             <p:nvSpPr>
               <p:cNvPr id="78" name="TextBox 77">
@@ -5960,7 +5960,7 @@
             </p:txBody>
           </p:sp>
         </mc:Choice>
-        <mc:Fallback>
+        <mc:Fallback xmlns="">
           <p:sp>
             <p:nvSpPr>
               <p:cNvPr id="78" name="TextBox 77">

</xml_diff>